<commit_message>
DONE RPZ and added PDF for presentation
</commit_message>
<xml_diff>
--- a/Presentation/Pronin DataBaseCybersport.pptx
+++ b/Presentation/Pronin DataBaseCybersport.pptx
@@ -5,7 +5,7 @@
     <p:sldMasterId id="2147483648" r:id="rId1"/>
   </p:sldMasterIdLst>
   <p:notesMasterIdLst>
-    <p:notesMasterId r:id="rId18"/>
+    <p:notesMasterId r:id="rId17"/>
   </p:notesMasterIdLst>
   <p:sldIdLst>
     <p:sldId id="256" r:id="rId2"/>
@@ -14,16 +14,15 @@
     <p:sldId id="259" r:id="rId5"/>
     <p:sldId id="260" r:id="rId6"/>
     <p:sldId id="261" r:id="rId7"/>
-    <p:sldId id="262" r:id="rId8"/>
-    <p:sldId id="263" r:id="rId9"/>
-    <p:sldId id="264" r:id="rId10"/>
-    <p:sldId id="268" r:id="rId11"/>
-    <p:sldId id="269" r:id="rId12"/>
-    <p:sldId id="270" r:id="rId13"/>
-    <p:sldId id="271" r:id="rId14"/>
-    <p:sldId id="272" r:id="rId15"/>
-    <p:sldId id="267" r:id="rId16"/>
-    <p:sldId id="266" r:id="rId17"/>
+    <p:sldId id="263" r:id="rId8"/>
+    <p:sldId id="264" r:id="rId9"/>
+    <p:sldId id="268" r:id="rId10"/>
+    <p:sldId id="269" r:id="rId11"/>
+    <p:sldId id="270" r:id="rId12"/>
+    <p:sldId id="271" r:id="rId13"/>
+    <p:sldId id="272" r:id="rId14"/>
+    <p:sldId id="267" r:id="rId15"/>
+    <p:sldId id="266" r:id="rId16"/>
   </p:sldIdLst>
   <p:sldSz cx="12192000" cy="6858000"/>
   <p:notesSz cx="6858000" cy="9144000"/>
@@ -544,7 +543,7 @@
           <a:p>
             <a:fld id="{4BFF52A9-5122-4760-8E24-BCA384AEE220}" type="slidenum">
               <a:rPr lang="ru-RU" smtClean="0"/>
-              <a:t>16</a:t>
+              <a:t>15</a:t>
             </a:fld>
             <a:endParaRPr lang="ru-RU"/>
           </a:p>
@@ -4138,127 +4137,6 @@
           <p:cNvPr id="2" name="Заголовок 1">
             <a:extLst>
               <a:ext uri="{FF2B5EF4-FFF2-40B4-BE49-F238E27FC236}">
-                <a16:creationId xmlns:a16="http://schemas.microsoft.com/office/drawing/2014/main" id="{617CA743-8B67-4D98-9D15-A46FE3097732}"/>
-              </a:ext>
-            </a:extLst>
-          </p:cNvPr>
-          <p:cNvSpPr>
-            <a:spLocks noGrp="1"/>
-          </p:cNvSpPr>
-          <p:nvPr>
-            <p:ph type="title"/>
-          </p:nvPr>
-        </p:nvSpPr>
-        <p:spPr/>
-        <p:txBody>
-          <a:bodyPr/>
-          <a:lstStyle/>
-          <a:p>
-            <a:r>
-              <a:rPr lang="ru-RU" b="1" dirty="0"/>
-              <a:t>Основные инструменты, используемые для реализации и исследования</a:t>
-            </a:r>
-          </a:p>
-        </p:txBody>
-      </p:sp>
-      <p:sp>
-        <p:nvSpPr>
-          <p:cNvPr id="3" name="Объект 2">
-            <a:extLst>
-              <a:ext uri="{FF2B5EF4-FFF2-40B4-BE49-F238E27FC236}">
-                <a16:creationId xmlns:a16="http://schemas.microsoft.com/office/drawing/2014/main" id="{CD770546-E6D4-498A-BA07-7DCFE77AF25E}"/>
-              </a:ext>
-            </a:extLst>
-          </p:cNvPr>
-          <p:cNvSpPr>
-            <a:spLocks noGrp="1"/>
-          </p:cNvSpPr>
-          <p:nvPr>
-            <p:ph idx="1"/>
-          </p:nvPr>
-        </p:nvSpPr>
-        <p:spPr/>
-        <p:txBody>
-          <a:bodyPr/>
-          <a:lstStyle/>
-          <a:p>
-            <a:r>
-              <a:rPr lang="ru-RU" dirty="0"/>
-              <a:t>Язык программирования C++</a:t>
-            </a:r>
-            <a:endParaRPr lang="en-US" dirty="0"/>
-          </a:p>
-          <a:p>
-            <a:r>
-              <a:rPr lang="ru-RU" dirty="0"/>
-              <a:t>Кроссплатформенный фреймворк Qt</a:t>
-            </a:r>
-          </a:p>
-          <a:p>
-            <a:r>
-              <a:rPr lang="ru-RU" dirty="0"/>
-              <a:t>Среда разработки Qt creator</a:t>
-            </a:r>
-            <a:endParaRPr lang="en-US" dirty="0"/>
-          </a:p>
-          <a:p>
-            <a:r>
-              <a:rPr lang="ru-RU" dirty="0"/>
-              <a:t>Система версионного контроля git</a:t>
-            </a:r>
-            <a:endParaRPr lang="en-US" dirty="0"/>
-          </a:p>
-          <a:p>
-            <a:r>
-              <a:rPr lang="ru-RU" dirty="0"/>
-              <a:t>СУБД </a:t>
-            </a:r>
-            <a:r>
-              <a:rPr lang="en-US" dirty="0" err="1"/>
-              <a:t>postgreSQL</a:t>
-            </a:r>
-            <a:endParaRPr lang="en-US" dirty="0"/>
-          </a:p>
-          <a:p>
-            <a:endParaRPr lang="ru-RU" dirty="0"/>
-          </a:p>
-        </p:txBody>
-      </p:sp>
-    </p:spTree>
-    <p:extLst>
-      <p:ext uri="{BB962C8B-B14F-4D97-AF65-F5344CB8AC3E}">
-        <p14:creationId xmlns:p14="http://schemas.microsoft.com/office/powerpoint/2010/main" val="3788809847"/>
-      </p:ext>
-    </p:extLst>
-  </p:cSld>
-  <p:clrMapOvr>
-    <a:masterClrMapping/>
-  </p:clrMapOvr>
-</p:sld>
-</file>
-
-<file path=ppt/slides/slide11.xml><?xml version="1.0" encoding="utf-8"?>
-<p:sld xmlns:a="http://schemas.openxmlformats.org/drawingml/2006/main" xmlns:r="http://schemas.openxmlformats.org/officeDocument/2006/relationships" xmlns:p="http://schemas.openxmlformats.org/presentationml/2006/main">
-  <p:cSld>
-    <p:spTree>
-      <p:nvGrpSpPr>
-        <p:cNvPr id="1" name=""/>
-        <p:cNvGrpSpPr/>
-        <p:nvPr/>
-      </p:nvGrpSpPr>
-      <p:grpSpPr>
-        <a:xfrm>
-          <a:off x="0" y="0"/>
-          <a:ext cx="0" cy="0"/>
-          <a:chOff x="0" y="0"/>
-          <a:chExt cx="0" cy="0"/>
-        </a:xfrm>
-      </p:grpSpPr>
-      <p:sp>
-        <p:nvSpPr>
-          <p:cNvPr id="2" name="Заголовок 1">
-            <a:extLst>
-              <a:ext uri="{FF2B5EF4-FFF2-40B4-BE49-F238E27FC236}">
                 <a16:creationId xmlns:a16="http://schemas.microsoft.com/office/drawing/2014/main" id="{8F3A17A2-C3B2-46B2-8978-894BC283D634}"/>
               </a:ext>
             </a:extLst>
@@ -4331,7 +4209,7 @@
 </p:sld>
 </file>
 
-<file path=ppt/slides/slide12.xml><?xml version="1.0" encoding="utf-8"?>
+<file path=ppt/slides/slide11.xml><?xml version="1.0" encoding="utf-8"?>
 <p:sld xmlns:a="http://schemas.openxmlformats.org/drawingml/2006/main" xmlns:r="http://schemas.openxmlformats.org/officeDocument/2006/relationships" xmlns:p="http://schemas.openxmlformats.org/presentationml/2006/main">
   <p:cSld>
     <p:spTree>
@@ -4425,7 +4303,7 @@
 </p:sld>
 </file>
 
-<file path=ppt/slides/slide13.xml><?xml version="1.0" encoding="utf-8"?>
+<file path=ppt/slides/slide12.xml><?xml version="1.0" encoding="utf-8"?>
 <p:sld xmlns:a="http://schemas.openxmlformats.org/drawingml/2006/main" xmlns:r="http://schemas.openxmlformats.org/officeDocument/2006/relationships" xmlns:p="http://schemas.openxmlformats.org/presentationml/2006/main">
   <p:cSld>
     <p:spTree>
@@ -4519,7 +4397,7 @@
 </p:sld>
 </file>
 
-<file path=ppt/slides/slide14.xml><?xml version="1.0" encoding="utf-8"?>
+<file path=ppt/slides/slide13.xml><?xml version="1.0" encoding="utf-8"?>
 <p:sld xmlns:a="http://schemas.openxmlformats.org/drawingml/2006/main" xmlns:r="http://schemas.openxmlformats.org/officeDocument/2006/relationships" xmlns:p="http://schemas.openxmlformats.org/presentationml/2006/main">
   <p:cSld>
     <p:spTree>
@@ -4613,7 +4491,7 @@
 </p:sld>
 </file>
 
-<file path=ppt/slides/slide15.xml><?xml version="1.0" encoding="utf-8"?>
+<file path=ppt/slides/slide14.xml><?xml version="1.0" encoding="utf-8"?>
 <p:sld xmlns:a="http://schemas.openxmlformats.org/drawingml/2006/main" xmlns:r="http://schemas.openxmlformats.org/officeDocument/2006/relationships" xmlns:p="http://schemas.openxmlformats.org/presentationml/2006/main">
   <p:cSld>
     <p:spTree>
@@ -4708,7 +4586,7 @@
 </p:sld>
 </file>
 
-<file path=ppt/slides/slide16.xml><?xml version="1.0" encoding="utf-8"?>
+<file path=ppt/slides/slide15.xml><?xml version="1.0" encoding="utf-8"?>
 <p:sld xmlns:a="http://schemas.openxmlformats.org/drawingml/2006/main" xmlns:r="http://schemas.openxmlformats.org/officeDocument/2006/relationships" xmlns:p="http://schemas.openxmlformats.org/presentationml/2006/main">
   <p:cSld>
     <p:spTree>
@@ -4782,7 +4660,7 @@
         </p:spPr>
         <p:txBody>
           <a:bodyPr>
-            <a:normAutofit fontScale="85000" lnSpcReduction="20000"/>
+            <a:normAutofit fontScale="70000" lnSpcReduction="20000"/>
           </a:bodyPr>
           <a:lstStyle/>
           <a:p>
@@ -4871,8 +4749,16 @@
             <a:pPr lvl="0"/>
             <a:r>
               <a:rPr lang="ru-RU" dirty="0"/>
-              <a:t>разработана программа, реализующая поставленную задачу.</a:t>
-            </a:r>
+              <a:t>разработана программа, реализующая поставленную задачу;</a:t>
+            </a:r>
+          </a:p>
+          <a:p>
+            <a:pPr lvl="0"/>
+            <a:r>
+              <a:rPr lang="ru-RU"/>
+              <a:t>проведен сравнительный анализ времени выполнения запросов к базе данных с использованием индексов и без.</a:t>
+            </a:r>
+            <a:endParaRPr lang="ru-RU" dirty="0"/>
           </a:p>
         </p:txBody>
       </p:sp>
@@ -5160,7 +5046,7 @@
           <a:graphicData uri="http://schemas.openxmlformats.org/presentationml/2006/ole">
             <mc:AlternateContent xmlns:mc="http://schemas.openxmlformats.org/markup-compatibility/2006">
               <mc:Choice xmlns:v="urn:schemas-microsoft-com:vml" Requires="v">
-                <p:oleObj spid="_x0000_s1040" name="Точечный рисунок" r:id="rId3" imgW="3726360" imgH="4358520" progId="Paint.Picture">
+                <p:oleObj spid="_x0000_s1046" name="Точечный рисунок" r:id="rId3" imgW="3726360" imgH="4358520" progId="Paint.Picture">
                   <p:embed/>
                 </p:oleObj>
               </mc:Choice>
@@ -5223,7 +5109,7 @@
           <a:graphicData uri="http://schemas.openxmlformats.org/presentationml/2006/ole">
             <mc:AlternateContent xmlns:mc="http://schemas.openxmlformats.org/markup-compatibility/2006">
               <mc:Choice xmlns:v="urn:schemas-microsoft-com:vml" Requires="v">
-                <p:oleObj spid="_x0000_s1041" name="Точечный рисунок" r:id="rId5" imgW="6477120" imgH="5181480" progId="Paint.Picture">
+                <p:oleObj spid="_x0000_s1047" name="Точечный рисунок" r:id="rId5" imgW="6477120" imgH="5181480" progId="Paint.Picture">
                   <p:embed/>
                 </p:oleObj>
               </mc:Choice>
@@ -5612,126 +5498,6 @@
           <p:cNvPr id="2" name="Заголовок 1">
             <a:extLst>
               <a:ext uri="{FF2B5EF4-FFF2-40B4-BE49-F238E27FC236}">
-                <a16:creationId xmlns:a16="http://schemas.microsoft.com/office/drawing/2014/main" id="{617CA743-8B67-4D98-9D15-A46FE3097732}"/>
-              </a:ext>
-            </a:extLst>
-          </p:cNvPr>
-          <p:cNvSpPr>
-            <a:spLocks noGrp="1"/>
-          </p:cNvSpPr>
-          <p:nvPr>
-            <p:ph type="title"/>
-          </p:nvPr>
-        </p:nvSpPr>
-        <p:spPr/>
-        <p:txBody>
-          <a:bodyPr/>
-          <a:lstStyle/>
-          <a:p>
-            <a:r>
-              <a:rPr lang="ru-RU" b="1" dirty="0"/>
-              <a:t>Основные инструменты, используемые для реализации и исследования</a:t>
-            </a:r>
-          </a:p>
-        </p:txBody>
-      </p:sp>
-      <p:sp>
-        <p:nvSpPr>
-          <p:cNvPr id="3" name="Объект 2">
-            <a:extLst>
-              <a:ext uri="{FF2B5EF4-FFF2-40B4-BE49-F238E27FC236}">
-                <a16:creationId xmlns:a16="http://schemas.microsoft.com/office/drawing/2014/main" id="{CD770546-E6D4-498A-BA07-7DCFE77AF25E}"/>
-              </a:ext>
-            </a:extLst>
-          </p:cNvPr>
-          <p:cNvSpPr>
-            <a:spLocks noGrp="1"/>
-          </p:cNvSpPr>
-          <p:nvPr>
-            <p:ph idx="1"/>
-          </p:nvPr>
-        </p:nvSpPr>
-        <p:spPr/>
-        <p:txBody>
-          <a:bodyPr/>
-          <a:lstStyle/>
-          <a:p>
-            <a:r>
-              <a:rPr lang="ru-RU" dirty="0"/>
-              <a:t>Язык программирования C++</a:t>
-            </a:r>
-            <a:endParaRPr lang="en-US" dirty="0"/>
-          </a:p>
-          <a:p>
-            <a:r>
-              <a:rPr lang="ru-RU" dirty="0"/>
-              <a:t>Кроссплатформенный фреймворк Qt</a:t>
-            </a:r>
-          </a:p>
-          <a:p>
-            <a:r>
-              <a:rPr lang="ru-RU" dirty="0"/>
-              <a:t>Среда разработки Qt creator</a:t>
-            </a:r>
-            <a:endParaRPr lang="en-US" dirty="0"/>
-          </a:p>
-          <a:p>
-            <a:r>
-              <a:rPr lang="ru-RU" dirty="0"/>
-              <a:t>Система версионного контроля git</a:t>
-            </a:r>
-            <a:endParaRPr lang="en-US" dirty="0"/>
-          </a:p>
-          <a:p>
-            <a:r>
-              <a:rPr lang="ru-RU" dirty="0"/>
-              <a:t>Библиотека </a:t>
-            </a:r>
-            <a:r>
-              <a:rPr lang="en-US" dirty="0"/>
-              <a:t>clock()</a:t>
-            </a:r>
-          </a:p>
-          <a:p>
-            <a:endParaRPr lang="ru-RU" dirty="0"/>
-          </a:p>
-        </p:txBody>
-      </p:sp>
-    </p:spTree>
-    <p:extLst>
-      <p:ext uri="{BB962C8B-B14F-4D97-AF65-F5344CB8AC3E}">
-        <p14:creationId xmlns:p14="http://schemas.microsoft.com/office/powerpoint/2010/main" val="3453924224"/>
-      </p:ext>
-    </p:extLst>
-  </p:cSld>
-  <p:clrMapOvr>
-    <a:masterClrMapping/>
-  </p:clrMapOvr>
-</p:sld>
-</file>
-
-<file path=ppt/slides/slide8.xml><?xml version="1.0" encoding="utf-8"?>
-<p:sld xmlns:a="http://schemas.openxmlformats.org/drawingml/2006/main" xmlns:r="http://schemas.openxmlformats.org/officeDocument/2006/relationships" xmlns:p="http://schemas.openxmlformats.org/presentationml/2006/main">
-  <p:cSld>
-    <p:spTree>
-      <p:nvGrpSpPr>
-        <p:cNvPr id="1" name=""/>
-        <p:cNvGrpSpPr/>
-        <p:nvPr/>
-      </p:nvGrpSpPr>
-      <p:grpSpPr>
-        <a:xfrm>
-          <a:off x="0" y="0"/>
-          <a:ext cx="0" cy="0"/>
-          <a:chOff x="0" y="0"/>
-          <a:chExt cx="0" cy="0"/>
-        </a:xfrm>
-      </p:grpSpPr>
-      <p:sp>
-        <p:nvSpPr>
-          <p:cNvPr id="2" name="Заголовок 1">
-            <a:extLst>
-              <a:ext uri="{FF2B5EF4-FFF2-40B4-BE49-F238E27FC236}">
                 <a16:creationId xmlns:a16="http://schemas.microsoft.com/office/drawing/2014/main" id="{8F3A17A2-C3B2-46B2-8978-894BC283D634}"/>
               </a:ext>
             </a:extLst>
@@ -5798,7 +5564,7 @@
 </p:sld>
 </file>
 
-<file path=ppt/slides/slide9.xml><?xml version="1.0" encoding="utf-8"?>
+<file path=ppt/slides/slide8.xml><?xml version="1.0" encoding="utf-8"?>
 <p:sld xmlns:a="http://schemas.openxmlformats.org/drawingml/2006/main" xmlns:r="http://schemas.openxmlformats.org/officeDocument/2006/relationships" xmlns:p="http://schemas.openxmlformats.org/presentationml/2006/main">
   <p:cSld>
     <p:spTree>
@@ -5937,6 +5703,127 @@
     <p:extLst>
       <p:ext uri="{BB962C8B-B14F-4D97-AF65-F5344CB8AC3E}">
         <p14:creationId xmlns:p14="http://schemas.microsoft.com/office/powerpoint/2010/main" val="2938798014"/>
+      </p:ext>
+    </p:extLst>
+  </p:cSld>
+  <p:clrMapOvr>
+    <a:masterClrMapping/>
+  </p:clrMapOvr>
+</p:sld>
+</file>
+
+<file path=ppt/slides/slide9.xml><?xml version="1.0" encoding="utf-8"?>
+<p:sld xmlns:a="http://schemas.openxmlformats.org/drawingml/2006/main" xmlns:r="http://schemas.openxmlformats.org/officeDocument/2006/relationships" xmlns:p="http://schemas.openxmlformats.org/presentationml/2006/main">
+  <p:cSld>
+    <p:spTree>
+      <p:nvGrpSpPr>
+        <p:cNvPr id="1" name=""/>
+        <p:cNvGrpSpPr/>
+        <p:nvPr/>
+      </p:nvGrpSpPr>
+      <p:grpSpPr>
+        <a:xfrm>
+          <a:off x="0" y="0"/>
+          <a:ext cx="0" cy="0"/>
+          <a:chOff x="0" y="0"/>
+          <a:chExt cx="0" cy="0"/>
+        </a:xfrm>
+      </p:grpSpPr>
+      <p:sp>
+        <p:nvSpPr>
+          <p:cNvPr id="2" name="Заголовок 1">
+            <a:extLst>
+              <a:ext uri="{FF2B5EF4-FFF2-40B4-BE49-F238E27FC236}">
+                <a16:creationId xmlns:a16="http://schemas.microsoft.com/office/drawing/2014/main" id="{617CA743-8B67-4D98-9D15-A46FE3097732}"/>
+              </a:ext>
+            </a:extLst>
+          </p:cNvPr>
+          <p:cNvSpPr>
+            <a:spLocks noGrp="1"/>
+          </p:cNvSpPr>
+          <p:nvPr>
+            <p:ph type="title"/>
+          </p:nvPr>
+        </p:nvSpPr>
+        <p:spPr/>
+        <p:txBody>
+          <a:bodyPr/>
+          <a:lstStyle/>
+          <a:p>
+            <a:r>
+              <a:rPr lang="ru-RU" b="1" dirty="0"/>
+              <a:t>Основные инструменты, используемые для реализации и исследования</a:t>
+            </a:r>
+          </a:p>
+        </p:txBody>
+      </p:sp>
+      <p:sp>
+        <p:nvSpPr>
+          <p:cNvPr id="3" name="Объект 2">
+            <a:extLst>
+              <a:ext uri="{FF2B5EF4-FFF2-40B4-BE49-F238E27FC236}">
+                <a16:creationId xmlns:a16="http://schemas.microsoft.com/office/drawing/2014/main" id="{CD770546-E6D4-498A-BA07-7DCFE77AF25E}"/>
+              </a:ext>
+            </a:extLst>
+          </p:cNvPr>
+          <p:cNvSpPr>
+            <a:spLocks noGrp="1"/>
+          </p:cNvSpPr>
+          <p:nvPr>
+            <p:ph idx="1"/>
+          </p:nvPr>
+        </p:nvSpPr>
+        <p:spPr/>
+        <p:txBody>
+          <a:bodyPr/>
+          <a:lstStyle/>
+          <a:p>
+            <a:r>
+              <a:rPr lang="ru-RU" dirty="0"/>
+              <a:t>язык программирования C++</a:t>
+            </a:r>
+            <a:endParaRPr lang="en-US" dirty="0"/>
+          </a:p>
+          <a:p>
+            <a:r>
+              <a:rPr lang="ru-RU" dirty="0"/>
+              <a:t>кроссплатформенный фреймворк Qt</a:t>
+            </a:r>
+          </a:p>
+          <a:p>
+            <a:r>
+              <a:rPr lang="ru-RU" dirty="0"/>
+              <a:t>среда разработки Qt creator</a:t>
+            </a:r>
+            <a:endParaRPr lang="en-US" dirty="0"/>
+          </a:p>
+          <a:p>
+            <a:r>
+              <a:rPr lang="ru-RU" dirty="0"/>
+              <a:t>система версионного контроля git</a:t>
+            </a:r>
+            <a:endParaRPr lang="en-US" dirty="0"/>
+          </a:p>
+          <a:p>
+            <a:r>
+              <a:rPr lang="ru-RU" dirty="0"/>
+              <a:t>СУБД </a:t>
+            </a:r>
+            <a:r>
+              <a:rPr lang="en-US" dirty="0" err="1"/>
+              <a:t>postgreSQL</a:t>
+            </a:r>
+            <a:endParaRPr lang="en-US" dirty="0"/>
+          </a:p>
+          <a:p>
+            <a:endParaRPr lang="ru-RU" dirty="0"/>
+          </a:p>
+        </p:txBody>
+      </p:sp>
+    </p:spTree>
+    <p:extLst>
+      <p:ext uri="{BB962C8B-B14F-4D97-AF65-F5344CB8AC3E}">
+        <p14:creationId xmlns:p14="http://schemas.microsoft.com/office/powerpoint/2010/main" val="3788809847"/>
       </p:ext>
     </p:extLst>
   </p:cSld>

</xml_diff>